<commit_message>
Test html with data
</commit_message>
<xml_diff>
--- a/study-note/자바/2022-08-29 내용정리.pptx
+++ b/study-note/자바/2022-08-29 내용정리.pptx
@@ -245,7 +245,7 @@
           <a:p>
             <a:fld id="{F526C2EA-361D-406E-8534-6CB21787882E}" type="datetimeFigureOut">
               <a:rPr lang="ko-KR" altLang="en-US" smtClean="0"/>
-              <a:t>2022. 8. 29.</a:t>
+              <a:t>2022. 8. 30.</a:t>
             </a:fld>
             <a:endParaRPr lang="ko-KR" altLang="en-US"/>
           </a:p>
@@ -659,7 +659,7 @@
           <a:p>
             <a:fld id="{E429DD96-549C-4464-A555-B392FBD40474}" type="datetimeFigureOut">
               <a:rPr lang="ko-KR" altLang="en-US" smtClean="0"/>
-              <a:t>2022. 8. 29.</a:t>
+              <a:t>2022. 8. 30.</a:t>
             </a:fld>
             <a:endParaRPr lang="ko-KR" altLang="en-US"/>
           </a:p>
@@ -857,7 +857,7 @@
           <a:p>
             <a:fld id="{E429DD96-549C-4464-A555-B392FBD40474}" type="datetimeFigureOut">
               <a:rPr lang="ko-KR" altLang="en-US" smtClean="0"/>
-              <a:t>2022. 8. 29.</a:t>
+              <a:t>2022. 8. 30.</a:t>
             </a:fld>
             <a:endParaRPr lang="ko-KR" altLang="en-US"/>
           </a:p>
@@ -1065,7 +1065,7 @@
           <a:p>
             <a:fld id="{E429DD96-549C-4464-A555-B392FBD40474}" type="datetimeFigureOut">
               <a:rPr lang="ko-KR" altLang="en-US" smtClean="0"/>
-              <a:t>2022. 8. 29.</a:t>
+              <a:t>2022. 8. 30.</a:t>
             </a:fld>
             <a:endParaRPr lang="ko-KR" altLang="en-US"/>
           </a:p>
@@ -1263,7 +1263,7 @@
           <a:p>
             <a:fld id="{E429DD96-549C-4464-A555-B392FBD40474}" type="datetimeFigureOut">
               <a:rPr lang="ko-KR" altLang="en-US" smtClean="0"/>
-              <a:t>2022. 8. 29.</a:t>
+              <a:t>2022. 8. 30.</a:t>
             </a:fld>
             <a:endParaRPr lang="ko-KR" altLang="en-US"/>
           </a:p>
@@ -1538,7 +1538,7 @@
           <a:p>
             <a:fld id="{E429DD96-549C-4464-A555-B392FBD40474}" type="datetimeFigureOut">
               <a:rPr lang="ko-KR" altLang="en-US" smtClean="0"/>
-              <a:t>2022. 8. 29.</a:t>
+              <a:t>2022. 8. 30.</a:t>
             </a:fld>
             <a:endParaRPr lang="ko-KR" altLang="en-US"/>
           </a:p>
@@ -1803,7 +1803,7 @@
           <a:p>
             <a:fld id="{E429DD96-549C-4464-A555-B392FBD40474}" type="datetimeFigureOut">
               <a:rPr lang="ko-KR" altLang="en-US" smtClean="0"/>
-              <a:t>2022. 8. 29.</a:t>
+              <a:t>2022. 8. 30.</a:t>
             </a:fld>
             <a:endParaRPr lang="ko-KR" altLang="en-US"/>
           </a:p>
@@ -2215,7 +2215,7 @@
           <a:p>
             <a:fld id="{E429DD96-549C-4464-A555-B392FBD40474}" type="datetimeFigureOut">
               <a:rPr lang="ko-KR" altLang="en-US" smtClean="0"/>
-              <a:t>2022. 8. 29.</a:t>
+              <a:t>2022. 8. 30.</a:t>
             </a:fld>
             <a:endParaRPr lang="ko-KR" altLang="en-US"/>
           </a:p>
@@ -2356,7 +2356,7 @@
           <a:p>
             <a:fld id="{E429DD96-549C-4464-A555-B392FBD40474}" type="datetimeFigureOut">
               <a:rPr lang="ko-KR" altLang="en-US" smtClean="0"/>
-              <a:t>2022. 8. 29.</a:t>
+              <a:t>2022. 8. 30.</a:t>
             </a:fld>
             <a:endParaRPr lang="ko-KR" altLang="en-US"/>
           </a:p>
@@ -2469,7 +2469,7 @@
           <a:p>
             <a:fld id="{E429DD96-549C-4464-A555-B392FBD40474}" type="datetimeFigureOut">
               <a:rPr lang="ko-KR" altLang="en-US" smtClean="0"/>
-              <a:t>2022. 8. 29.</a:t>
+              <a:t>2022. 8. 30.</a:t>
             </a:fld>
             <a:endParaRPr lang="ko-KR" altLang="en-US"/>
           </a:p>
@@ -2780,7 +2780,7 @@
           <a:p>
             <a:fld id="{E429DD96-549C-4464-A555-B392FBD40474}" type="datetimeFigureOut">
               <a:rPr lang="ko-KR" altLang="en-US" smtClean="0"/>
-              <a:t>2022. 8. 29.</a:t>
+              <a:t>2022. 8. 30.</a:t>
             </a:fld>
             <a:endParaRPr lang="ko-KR" altLang="en-US"/>
           </a:p>
@@ -3068,7 +3068,7 @@
           <a:p>
             <a:fld id="{E429DD96-549C-4464-A555-B392FBD40474}" type="datetimeFigureOut">
               <a:rPr lang="ko-KR" altLang="en-US" smtClean="0"/>
-              <a:t>2022. 8. 29.</a:t>
+              <a:t>2022. 8. 30.</a:t>
             </a:fld>
             <a:endParaRPr lang="ko-KR" altLang="en-US"/>
           </a:p>
@@ -3309,7 +3309,7 @@
           <a:p>
             <a:fld id="{E429DD96-549C-4464-A555-B392FBD40474}" type="datetimeFigureOut">
               <a:rPr lang="ko-KR" altLang="en-US" smtClean="0"/>
-              <a:t>2022. 8. 29.</a:t>
+              <a:t>2022. 8. 30.</a:t>
             </a:fld>
             <a:endParaRPr lang="ko-KR" altLang="en-US"/>
           </a:p>
@@ -9576,7 +9576,7 @@
         </p:nvSpPr>
         <p:spPr>
           <a:xfrm>
-            <a:off x="5532476" y="2369966"/>
+            <a:off x="5617536" y="1102240"/>
             <a:ext cx="4068726" cy="776162"/>
           </a:xfrm>
           <a:prstGeom prst="mathMultiply">

</xml_diff>